<commit_message>
add timeweighting image and other stuff
</commit_message>
<xml_diff>
--- a/InstagramPres.pptx
+++ b/InstagramPres.pptx
@@ -9,6 +9,7 @@
     <p:sldId id="259" r:id="rId3"/>
     <p:sldId id="257" r:id="rId4"/>
     <p:sldId id="258" r:id="rId5"/>
+    <p:sldId id="260" r:id="rId6"/>
   </p:sldIdLst>
   <p:sldSz cx="12192000" cy="6858000"/>
   <p:notesSz cx="6858000" cy="9144000"/>
@@ -154,7 +155,7 @@
           </ac:spMkLst>
         </pc:spChg>
         <pc:spChg chg="mod">
-          <ac:chgData name="Maarten Mol" userId="3184df8ecd641b88" providerId="LiveId" clId="{3F92364E-B00F-4B1C-B129-85B4F1C3487C}" dt="2017-10-19T12:48:51.307" v="185"/>
+          <ac:chgData name="Maarten Mol" userId="3184df8ecd641b88" providerId="LiveId" clId="{3F92364E-B00F-4B1C-B129-85B4F1C3487C}" dt="2017-10-19T12:48:51.307" v="185" actId="1076"/>
           <ac:spMkLst>
             <pc:docMk/>
             <pc:sldMk cId="3282244591" sldId="257"/>
@@ -185,20 +186,20 @@
             <ac:spMk id="17" creationId="{A5CF2FC8-D184-4B10-83A5-61FC2148BE2B}"/>
           </ac:spMkLst>
         </pc:spChg>
+        <pc:picChg chg="add del mod">
+          <ac:chgData name="Maarten Mol" userId="3184df8ecd641b88" providerId="LiveId" clId="{3F92364E-B00F-4B1C-B129-85B4F1C3487C}" dt="2017-10-19T13:02:28.583" v="246" actId="478"/>
+          <ac:picMkLst>
+            <pc:docMk/>
+            <pc:sldMk cId="3282244591" sldId="257"/>
+            <ac:picMk id="5" creationId="{D2B4F3F2-2C8E-493C-ADC3-A38603017B99}"/>
+          </ac:picMkLst>
+        </pc:picChg>
         <pc:picChg chg="del">
           <ac:chgData name="Maarten Mol" userId="3184df8ecd641b88" providerId="LiveId" clId="{3F92364E-B00F-4B1C-B129-85B4F1C3487C}" dt="2017-10-19T12:40:22.322" v="3" actId="478"/>
           <ac:picMkLst>
             <pc:docMk/>
             <pc:sldMk cId="3282244591" sldId="257"/>
             <ac:picMk id="5" creationId="{EA0559B9-F0D7-4FA4-9D1D-123E1C88F18A}"/>
-          </ac:picMkLst>
-        </pc:picChg>
-        <pc:picChg chg="add del mod">
-          <ac:chgData name="Maarten Mol" userId="3184df8ecd641b88" providerId="LiveId" clId="{3F92364E-B00F-4B1C-B129-85B4F1C3487C}" dt="2017-10-19T13:02:28.583" v="246" actId="478"/>
-          <ac:picMkLst>
-            <pc:docMk/>
-            <pc:sldMk cId="3282244591" sldId="257"/>
-            <ac:picMk id="5" creationId="{D2B4F3F2-2C8E-493C-ADC3-A38603017B99}"/>
           </ac:picMkLst>
         </pc:picChg>
         <pc:picChg chg="add del mod ord">
@@ -266,6 +267,131 @@
       </pc:sldChg>
     </pc:docChg>
   </pc:docChgLst>
+  <pc:docChgLst>
+    <pc:chgData name="Aswathy Arun" userId="4f051d0ce0c47672" providerId="LiveId" clId="{6774F38D-E119-4300-933A-37DF443FA5BD}"/>
+    <pc:docChg chg="undo custSel addSld delSld modSld sldOrd">
+      <pc:chgData name="Aswathy Arun" userId="4f051d0ce0c47672" providerId="LiveId" clId="{6774F38D-E119-4300-933A-37DF443FA5BD}" dt="2017-10-19T17:13:15.188" v="185" actId="20577"/>
+      <pc:docMkLst>
+        <pc:docMk/>
+      </pc:docMkLst>
+      <pc:sldChg chg="addSp modSp">
+        <pc:chgData name="Aswathy Arun" userId="4f051d0ce0c47672" providerId="LiveId" clId="{6774F38D-E119-4300-933A-37DF443FA5BD}" dt="2017-10-19T17:11:30.708" v="162" actId="255"/>
+        <pc:sldMkLst>
+          <pc:docMk/>
+          <pc:sldMk cId="980268921" sldId="256"/>
+        </pc:sldMkLst>
+        <pc:spChg chg="mod">
+          <ac:chgData name="Aswathy Arun" userId="4f051d0ce0c47672" providerId="LiveId" clId="{6774F38D-E119-4300-933A-37DF443FA5BD}" dt="2017-10-19T17:07:16.404" v="34" actId="14100"/>
+          <ac:spMkLst>
+            <pc:docMk/>
+            <pc:sldMk cId="980268921" sldId="256"/>
+            <ac:spMk id="2" creationId="{50214148-1CB4-4047-9399-16C10ABD2D43}"/>
+          </ac:spMkLst>
+        </pc:spChg>
+        <pc:spChg chg="mod">
+          <ac:chgData name="Aswathy Arun" userId="4f051d0ce0c47672" providerId="LiveId" clId="{6774F38D-E119-4300-933A-37DF443FA5BD}" dt="2017-10-19T17:07:27.711" v="83" actId="1035"/>
+          <ac:spMkLst>
+            <pc:docMk/>
+            <pc:sldMk cId="980268921" sldId="256"/>
+            <ac:spMk id="3" creationId="{DD03F111-8A4A-44DF-B2EC-B88C8D005D43}"/>
+          </ac:spMkLst>
+        </pc:spChg>
+        <pc:spChg chg="add mod">
+          <ac:chgData name="Aswathy Arun" userId="4f051d0ce0c47672" providerId="LiveId" clId="{6774F38D-E119-4300-933A-37DF443FA5BD}" dt="2017-10-19T17:11:30.708" v="162" actId="255"/>
+          <ac:spMkLst>
+            <pc:docMk/>
+            <pc:sldMk cId="980268921" sldId="256"/>
+            <ac:spMk id="6" creationId="{9787F23F-D26F-4AE4-A6C4-3E7031AA7490}"/>
+          </ac:spMkLst>
+        </pc:spChg>
+        <pc:picChg chg="add mod">
+          <ac:chgData name="Aswathy Arun" userId="4f051d0ce0c47672" providerId="LiveId" clId="{6774F38D-E119-4300-933A-37DF443FA5BD}" dt="2017-10-19T17:07:02.655" v="28" actId="1036"/>
+          <ac:picMkLst>
+            <pc:docMk/>
+            <pc:sldMk cId="980268921" sldId="256"/>
+            <ac:picMk id="5" creationId="{BC17259C-14B9-4A5A-90A9-0E7E09992ED2}"/>
+          </ac:picMkLst>
+        </pc:picChg>
+      </pc:sldChg>
+      <pc:sldChg chg="addSp delSp modSp">
+        <pc:chgData name="Aswathy Arun" userId="4f051d0ce0c47672" providerId="LiveId" clId="{6774F38D-E119-4300-933A-37DF443FA5BD}" dt="2017-10-19T17:02:39.254" v="13" actId="1076"/>
+        <pc:sldMkLst>
+          <pc:docMk/>
+          <pc:sldMk cId="3282244591" sldId="257"/>
+        </pc:sldMkLst>
+        <pc:picChg chg="add mod">
+          <ac:chgData name="Aswathy Arun" userId="4f051d0ce0c47672" providerId="LiveId" clId="{6774F38D-E119-4300-933A-37DF443FA5BD}" dt="2017-10-19T17:02:39.254" v="13" actId="1076"/>
+          <ac:picMkLst>
+            <pc:docMk/>
+            <pc:sldMk cId="3282244591" sldId="257"/>
+            <ac:picMk id="5" creationId="{F2A477B0-F793-410B-B47A-57B59BB12A19}"/>
+          </ac:picMkLst>
+        </pc:picChg>
+        <pc:picChg chg="del">
+          <ac:chgData name="Aswathy Arun" userId="4f051d0ce0c47672" providerId="LiveId" clId="{6774F38D-E119-4300-933A-37DF443FA5BD}" dt="2017-10-19T17:01:41.956" v="0" actId="478"/>
+          <ac:picMkLst>
+            <pc:docMk/>
+            <pc:sldMk cId="3282244591" sldId="257"/>
+            <ac:picMk id="8" creationId="{C86F982C-A085-4558-B0C0-D4E575660E06}"/>
+          </ac:picMkLst>
+        </pc:picChg>
+      </pc:sldChg>
+      <pc:sldChg chg="addSp delSp modSp add del">
+        <pc:chgData name="Aswathy Arun" userId="4f051d0ce0c47672" providerId="LiveId" clId="{6774F38D-E119-4300-933A-37DF443FA5BD}" dt="2017-10-19T17:12:31.354" v="167" actId="2696"/>
+        <pc:sldMkLst>
+          <pc:docMk/>
+          <pc:sldMk cId="726494335" sldId="260"/>
+        </pc:sldMkLst>
+        <pc:spChg chg="mod">
+          <ac:chgData name="Aswathy Arun" userId="4f051d0ce0c47672" providerId="LiveId" clId="{6774F38D-E119-4300-933A-37DF443FA5BD}" dt="2017-10-19T17:11:52.716" v="166" actId="14100"/>
+          <ac:spMkLst>
+            <pc:docMk/>
+            <pc:sldMk cId="726494335" sldId="260"/>
+            <ac:spMk id="2" creationId="{29FCDDAB-B713-464B-939A-77A35753DA26}"/>
+          </ac:spMkLst>
+        </pc:spChg>
+        <pc:spChg chg="del">
+          <ac:chgData name="Aswathy Arun" userId="4f051d0ce0c47672" providerId="LiveId" clId="{6774F38D-E119-4300-933A-37DF443FA5BD}" dt="2017-10-19T17:11:47.149" v="164" actId="478"/>
+          <ac:spMkLst>
+            <pc:docMk/>
+            <pc:sldMk cId="726494335" sldId="260"/>
+            <ac:spMk id="3" creationId="{E0754D4A-CD59-4259-9220-B16BDACE9B5E}"/>
+          </ac:spMkLst>
+        </pc:spChg>
+        <pc:spChg chg="add del mod">
+          <ac:chgData name="Aswathy Arun" userId="4f051d0ce0c47672" providerId="LiveId" clId="{6774F38D-E119-4300-933A-37DF443FA5BD}" dt="2017-10-19T17:11:49.726" v="165" actId="478"/>
+          <ac:spMkLst>
+            <pc:docMk/>
+            <pc:sldMk cId="726494335" sldId="260"/>
+            <ac:spMk id="5" creationId="{61FCA936-37B7-4966-B1CA-E942C53D5CC4}"/>
+          </ac:spMkLst>
+        </pc:spChg>
+      </pc:sldChg>
+      <pc:sldChg chg="delSp modSp add ord">
+        <pc:chgData name="Aswathy Arun" userId="4f051d0ce0c47672" providerId="LiveId" clId="{6774F38D-E119-4300-933A-37DF443FA5BD}" dt="2017-10-19T17:13:15.188" v="185" actId="20577"/>
+        <pc:sldMkLst>
+          <pc:docMk/>
+          <pc:sldMk cId="3527343244" sldId="260"/>
+        </pc:sldMkLst>
+        <pc:spChg chg="mod">
+          <ac:chgData name="Aswathy Arun" userId="4f051d0ce0c47672" providerId="LiveId" clId="{6774F38D-E119-4300-933A-37DF443FA5BD}" dt="2017-10-19T17:13:15.188" v="185" actId="20577"/>
+          <ac:spMkLst>
+            <pc:docMk/>
+            <pc:sldMk cId="3527343244" sldId="260"/>
+            <ac:spMk id="2" creationId="{23EC3086-428F-4853-81A5-CE2F623528C2}"/>
+          </ac:spMkLst>
+        </pc:spChg>
+        <pc:spChg chg="del">
+          <ac:chgData name="Aswathy Arun" userId="4f051d0ce0c47672" providerId="LiveId" clId="{6774F38D-E119-4300-933A-37DF443FA5BD}" dt="2017-10-19T17:12:46.357" v="170" actId="478"/>
+          <ac:spMkLst>
+            <pc:docMk/>
+            <pc:sldMk cId="3527343244" sldId="260"/>
+            <ac:spMk id="3" creationId="{7E74447E-5FAC-43AC-8BA5-A264DD5C62D3}"/>
+          </ac:spMkLst>
+        </pc:spChg>
+      </pc:sldChg>
+    </pc:docChg>
+  </pc:docChgLst>
 </pc:chgInfo>
 </file>
 
@@ -537,7 +663,7 @@
             <a:fld id="{4FAB73BC-B049-4115-A692-8D63A059BFB8}" type="slidenum">
               <a:rPr lang="en-US" dirty="0"/>
               <a:pPr/>
-              <a:t>‹nr.›</a:t>
+              <a:t>‹#›</a:t>
             </a:fld>
             <a:endParaRPr lang="en-US" dirty="0"/>
           </a:p>
@@ -704,7 +830,7 @@
             <a:fld id="{4FAB73BC-B049-4115-A692-8D63A059BFB8}" type="slidenum">
               <a:rPr lang="en-US" dirty="0"/>
               <a:pPr/>
-              <a:t>‹nr.›</a:t>
+              <a:t>‹#›</a:t>
             </a:fld>
             <a:endParaRPr lang="en-US" dirty="0"/>
           </a:p>
@@ -881,7 +1007,7 @@
             <a:fld id="{4FAB73BC-B049-4115-A692-8D63A059BFB8}" type="slidenum">
               <a:rPr lang="en-US" dirty="0"/>
               <a:pPr/>
-              <a:t>‹nr.›</a:t>
+              <a:t>‹#›</a:t>
             </a:fld>
             <a:endParaRPr lang="en-US" dirty="0"/>
           </a:p>
@@ -1048,7 +1174,7 @@
             <a:fld id="{4FAB73BC-B049-4115-A692-8D63A059BFB8}" type="slidenum">
               <a:rPr lang="en-US" dirty="0"/>
               <a:pPr/>
-              <a:t>‹nr.›</a:t>
+              <a:t>‹#›</a:t>
             </a:fld>
             <a:endParaRPr lang="en-US" dirty="0"/>
           </a:p>
@@ -1303,7 +1429,7 @@
             <a:fld id="{4FAB73BC-B049-4115-A692-8D63A059BFB8}" type="slidenum">
               <a:rPr lang="en-US" dirty="0"/>
               <a:pPr/>
-              <a:t>‹nr.›</a:t>
+              <a:t>‹#›</a:t>
             </a:fld>
             <a:endParaRPr lang="en-US" dirty="0"/>
           </a:p>
@@ -1588,7 +1714,7 @@
             <a:fld id="{4FAB73BC-B049-4115-A692-8D63A059BFB8}" type="slidenum">
               <a:rPr lang="en-US" dirty="0"/>
               <a:pPr/>
-              <a:t>‹nr.›</a:t>
+              <a:t>‹#›</a:t>
             </a:fld>
             <a:endParaRPr lang="en-US" dirty="0"/>
           </a:p>
@@ -2027,7 +2153,7 @@
             <a:fld id="{4FAB73BC-B049-4115-A692-8D63A059BFB8}" type="slidenum">
               <a:rPr lang="en-US" dirty="0"/>
               <a:pPr/>
-              <a:t>‹nr.›</a:t>
+              <a:t>‹#›</a:t>
             </a:fld>
             <a:endParaRPr lang="en-US" dirty="0"/>
           </a:p>
@@ -2142,7 +2268,7 @@
             <a:fld id="{4FAB73BC-B049-4115-A692-8D63A059BFB8}" type="slidenum">
               <a:rPr lang="en-US" dirty="0"/>
               <a:pPr/>
-              <a:t>‹nr.›</a:t>
+              <a:t>‹#›</a:t>
             </a:fld>
             <a:endParaRPr lang="en-US" dirty="0"/>
           </a:p>
@@ -2234,7 +2360,7 @@
             <a:fld id="{4FAB73BC-B049-4115-A692-8D63A059BFB8}" type="slidenum">
               <a:rPr lang="en-US" dirty="0"/>
               <a:pPr/>
-              <a:t>‹nr.›</a:t>
+              <a:t>‹#›</a:t>
             </a:fld>
             <a:endParaRPr lang="en-US" dirty="0"/>
           </a:p>
@@ -2519,7 +2645,7 @@
             <a:fld id="{4FAB73BC-B049-4115-A692-8D63A059BFB8}" type="slidenum">
               <a:rPr lang="en-US" dirty="0"/>
               <a:pPr/>
-              <a:t>‹nr.›</a:t>
+              <a:t>‹#›</a:t>
             </a:fld>
             <a:endParaRPr lang="en-US" dirty="0"/>
           </a:p>
@@ -2794,7 +2920,7 @@
             <a:fld id="{4FAB73BC-B049-4115-A692-8D63A059BFB8}" type="slidenum">
               <a:rPr lang="en-US" dirty="0"/>
               <a:pPr/>
-              <a:t>‹nr.›</a:t>
+              <a:t>‹#›</a:t>
             </a:fld>
             <a:endParaRPr lang="en-US" dirty="0"/>
           </a:p>
@@ -3118,7 +3244,7 @@
             <a:fld id="{4FAB73BC-B049-4115-A692-8D63A059BFB8}" type="slidenum">
               <a:rPr lang="en-US" dirty="0"/>
               <a:pPr/>
-              <a:t>‹nr.›</a:t>
+              <a:t>‹#›</a:t>
             </a:fld>
             <a:endParaRPr lang="en-US" dirty="0"/>
           </a:p>
@@ -3535,7 +3661,12 @@
             <p:ph type="ctrTitle"/>
           </p:nvPr>
         </p:nvSpPr>
-        <p:spPr/>
+        <p:spPr>
+          <a:xfrm>
+            <a:off x="1069848" y="1298448"/>
+            <a:ext cx="7315200" cy="3000175"/>
+          </a:xfrm>
+        </p:spPr>
         <p:txBody>
           <a:bodyPr>
             <a:normAutofit/>
@@ -3544,20 +3675,11 @@
           <a:p>
             <a:r>
               <a:rPr lang="nl-NL" sz="5000" dirty="0"/>
-              <a:t>Instagram </a:t>
-            </a:r>
-            <a:r>
-              <a:rPr lang="nl-NL" sz="5000" dirty="0" err="1"/>
-              <a:t>and</a:t>
-            </a:r>
-            <a:r>
+              <a:t>Instagram and happy faces</a:t>
+            </a:r>
+            <a:br>
               <a:rPr lang="nl-NL" sz="5000" dirty="0"/>
-              <a:t> happy </a:t>
-            </a:r>
-            <a:r>
-              <a:rPr lang="nl-NL" sz="5000" dirty="0" err="1"/>
-              <a:t>faces</a:t>
-            </a:r>
+            </a:br>
             <a:endParaRPr lang="nl-NL" sz="5000" dirty="0"/>
           </a:p>
         </p:txBody>
@@ -3580,7 +3702,7 @@
         </p:nvSpPr>
         <p:spPr>
           <a:xfrm>
-            <a:off x="1100015" y="4670246"/>
+            <a:off x="1100015" y="3652144"/>
             <a:ext cx="7315200" cy="914400"/>
           </a:xfrm>
         </p:spPr>
@@ -3675,6 +3797,158 @@
             <a:r>
               <a:rPr lang="nl-NL" dirty="0"/>
               <a:t>?</a:t>
+            </a:r>
+          </a:p>
+        </p:txBody>
+      </p:sp>
+      <p:pic>
+        <p:nvPicPr>
+          <p:cNvPr id="5" name="Picture 4">
+            <a:extLst>
+              <a:ext uri="{FF2B5EF4-FFF2-40B4-BE49-F238E27FC236}">
+                <a16:creationId xmlns:a16="http://schemas.microsoft.com/office/drawing/2014/main" id="{BC17259C-14B9-4A5A-90A9-0E7E09992ED2}"/>
+              </a:ext>
+            </a:extLst>
+          </p:cNvPr>
+          <p:cNvPicPr>
+            <a:picLocks noChangeAspect="1"/>
+          </p:cNvPicPr>
+          <p:nvPr/>
+        </p:nvPicPr>
+        <p:blipFill>
+          <a:blip r:embed="rId2"/>
+          <a:stretch>
+            <a:fillRect/>
+          </a:stretch>
+        </p:blipFill>
+        <p:spPr>
+          <a:xfrm>
+            <a:off x="284479" y="942847"/>
+            <a:ext cx="845313" cy="845313"/>
+          </a:xfrm>
+          <a:prstGeom prst="rect">
+            <a:avLst/>
+          </a:prstGeom>
+        </p:spPr>
+      </p:pic>
+      <p:sp>
+        <p:nvSpPr>
+          <p:cNvPr id="6" name="TextBox 5">
+            <a:extLst>
+              <a:ext uri="{FF2B5EF4-FFF2-40B4-BE49-F238E27FC236}">
+                <a16:creationId xmlns:a16="http://schemas.microsoft.com/office/drawing/2014/main" id="{9787F23F-D26F-4AE4-A6C4-3E7031AA7490}"/>
+              </a:ext>
+            </a:extLst>
+          </p:cNvPr>
+          <p:cNvSpPr txBox="1"/>
+          <p:nvPr/>
+        </p:nvSpPr>
+        <p:spPr>
+          <a:xfrm>
+            <a:off x="5978266" y="4654224"/>
+            <a:ext cx="2902333" cy="1077218"/>
+          </a:xfrm>
+          <a:prstGeom prst="rect">
+            <a:avLst/>
+          </a:prstGeom>
+          <a:noFill/>
+        </p:spPr>
+        <p:txBody>
+          <a:bodyPr wrap="none" rtlCol="0">
+            <a:spAutoFit/>
+          </a:bodyPr>
+          <a:lstStyle/>
+          <a:p>
+            <a:r>
+              <a:rPr lang="en-US" sz="1600" dirty="0">
+                <a:solidFill>
+                  <a:schemeClr val="bg1"/>
+                </a:solidFill>
+              </a:rPr>
+              <a:t>Aswathy George</a:t>
+            </a:r>
+          </a:p>
+          <a:p>
+            <a:r>
+              <a:rPr lang="en-US" sz="1600" dirty="0" err="1">
+                <a:solidFill>
+                  <a:schemeClr val="bg1"/>
+                </a:solidFill>
+              </a:rPr>
+              <a:t>Antonios</a:t>
+            </a:r>
+            <a:r>
+              <a:rPr lang="en-US" sz="1600" dirty="0">
+                <a:solidFill>
+                  <a:schemeClr val="bg1"/>
+                </a:solidFill>
+              </a:rPr>
+              <a:t>-Minas </a:t>
+            </a:r>
+            <a:r>
+              <a:rPr lang="en-US" sz="1600" dirty="0" err="1">
+                <a:solidFill>
+                  <a:schemeClr val="bg1"/>
+                </a:solidFill>
+              </a:rPr>
+              <a:t>Krasakis</a:t>
+            </a:r>
+            <a:endParaRPr lang="en-US" sz="1600" dirty="0">
+              <a:solidFill>
+                <a:schemeClr val="bg1"/>
+              </a:solidFill>
+            </a:endParaRPr>
+          </a:p>
+          <a:p>
+            <a:r>
+              <a:rPr lang="en-US" sz="1600" dirty="0">
+                <a:solidFill>
+                  <a:schemeClr val="bg1"/>
+                </a:solidFill>
+              </a:rPr>
+              <a:t> </a:t>
+            </a:r>
+            <a:r>
+              <a:rPr lang="en-US" sz="1600" dirty="0" err="1">
+                <a:solidFill>
+                  <a:schemeClr val="bg1"/>
+                </a:solidFill>
+              </a:rPr>
+              <a:t>Taxiarchis</a:t>
+            </a:r>
+            <a:r>
+              <a:rPr lang="en-US" sz="1600" dirty="0">
+                <a:solidFill>
+                  <a:schemeClr val="bg1"/>
+                </a:solidFill>
+              </a:rPr>
+              <a:t> </a:t>
+            </a:r>
+            <a:r>
+              <a:rPr lang="en-US" sz="1600" dirty="0" err="1">
+                <a:solidFill>
+                  <a:schemeClr val="bg1"/>
+                </a:solidFill>
+              </a:rPr>
+              <a:t>Papakostas</a:t>
+            </a:r>
+            <a:r>
+              <a:rPr lang="en-US" sz="1600" dirty="0">
+                <a:solidFill>
+                  <a:schemeClr val="bg1"/>
+                </a:solidFill>
+              </a:rPr>
+              <a:t>-Ioannidis</a:t>
+            </a:r>
+          </a:p>
+          <a:p>
+            <a:r>
+              <a:rPr lang="en-US" sz="1600" dirty="0">
+                <a:solidFill>
+                  <a:schemeClr val="bg1"/>
+                </a:solidFill>
+              </a:rPr>
+              <a:t>Maarten Mol</a:t>
             </a:r>
           </a:p>
         </p:txBody>
@@ -4020,8 +4294,8 @@
           </a:p>
         </p:txBody>
       </p:sp>
-      <mc:AlternateContent xmlns:mc="http://schemas.openxmlformats.org/markup-compatibility/2006">
-        <mc:Choice xmlns:a14="http://schemas.microsoft.com/office/drawing/2010/main" Requires="a14">
+      <mc:AlternateContent xmlns:mc="http://schemas.openxmlformats.org/markup-compatibility/2006" xmlns:a14="http://schemas.microsoft.com/office/drawing/2010/main">
+        <mc:Choice Requires="a14">
           <p:sp>
             <p:nvSpPr>
               <p:cNvPr id="3" name="Tijdelijke aanduiding voor inhoud 2">
@@ -4332,7 +4606,7 @@
             </p:txBody>
           </p:sp>
         </mc:Choice>
-        <mc:Fallback>
+        <mc:Fallback xmlns="">
           <p:sp>
             <p:nvSpPr>
               <p:cNvPr id="3" name="Tijdelijke aanduiding voor inhoud 2">
@@ -4378,10 +4652,10 @@
       </mc:AlternateContent>
       <p:pic>
         <p:nvPicPr>
-          <p:cNvPr id="8" name="Afbeelding 7">
+          <p:cNvPr id="5" name="Picture 4">
             <a:extLst>
               <a:ext uri="{FF2B5EF4-FFF2-40B4-BE49-F238E27FC236}">
-                <a16:creationId xmlns:a16="http://schemas.microsoft.com/office/drawing/2014/main" id="{C86F982C-A085-4558-B0C0-D4E575660E06}"/>
+                <a16:creationId xmlns:a16="http://schemas.microsoft.com/office/drawing/2014/main" id="{F2A477B0-F793-410B-B47A-57B59BB12A19}"/>
               </a:ext>
             </a:extLst>
           </p:cNvPr>
@@ -4398,8 +4672,8 @@
         </p:blipFill>
         <p:spPr>
           <a:xfrm>
-            <a:off x="5472545" y="2113659"/>
-            <a:ext cx="6401968" cy="2611329"/>
+            <a:off x="5761793" y="1574277"/>
+            <a:ext cx="5861539" cy="3937327"/>
           </a:xfrm>
           <a:prstGeom prst="rect">
             <a:avLst/>
@@ -4534,6 +4808,71 @@
     <p:extLst>
       <p:ext uri="{BB962C8B-B14F-4D97-AF65-F5344CB8AC3E}">
         <p14:creationId xmlns:p14="http://schemas.microsoft.com/office/powerpoint/2010/main" val="2060968390"/>
+      </p:ext>
+    </p:extLst>
+  </p:cSld>
+  <p:clrMapOvr>
+    <a:masterClrMapping/>
+  </p:clrMapOvr>
+</p:sld>
+</file>
+
+<file path=ppt/slides/slide5.xml><?xml version="1.0" encoding="utf-8"?>
+<p:sld xmlns:a="http://schemas.openxmlformats.org/drawingml/2006/main" xmlns:r="http://schemas.openxmlformats.org/officeDocument/2006/relationships" xmlns:p="http://schemas.openxmlformats.org/presentationml/2006/main">
+  <p:cSld>
+    <p:spTree>
+      <p:nvGrpSpPr>
+        <p:cNvPr id="1" name=""/>
+        <p:cNvGrpSpPr/>
+        <p:nvPr/>
+      </p:nvGrpSpPr>
+      <p:grpSpPr>
+        <a:xfrm>
+          <a:off x="0" y="0"/>
+          <a:ext cx="0" cy="0"/>
+          <a:chOff x="0" y="0"/>
+          <a:chExt cx="0" cy="0"/>
+        </a:xfrm>
+      </p:grpSpPr>
+      <p:sp>
+        <p:nvSpPr>
+          <p:cNvPr id="2" name="Title 1">
+            <a:extLst>
+              <a:ext uri="{FF2B5EF4-FFF2-40B4-BE49-F238E27FC236}">
+                <a16:creationId xmlns:a16="http://schemas.microsoft.com/office/drawing/2014/main" id="{23EC3086-428F-4853-81A5-CE2F623528C2}"/>
+              </a:ext>
+            </a:extLst>
+          </p:cNvPr>
+          <p:cNvSpPr>
+            <a:spLocks noGrp="1"/>
+          </p:cNvSpPr>
+          <p:nvPr>
+            <p:ph type="ctrTitle"/>
+          </p:nvPr>
+        </p:nvSpPr>
+        <p:spPr>
+          <a:xfrm>
+            <a:off x="1069848" y="1298448"/>
+            <a:ext cx="7315200" cy="4027696"/>
+          </a:xfrm>
+        </p:spPr>
+        <p:txBody>
+          <a:bodyPr anchor="ctr"/>
+          <a:lstStyle/>
+          <a:p>
+            <a:pPr algn="ctr"/>
+            <a:r>
+              <a:rPr lang="en-US"/>
+              <a:t>Questions?</a:t>
+            </a:r>
+            <a:endParaRPr lang="en-US" dirty="0"/>
+          </a:p>
+        </p:txBody>
+      </p:sp>
+    </p:spTree>
+    <p:extLst>
+      <p:ext uri="{BB962C8B-B14F-4D97-AF65-F5344CB8AC3E}">
+        <p14:creationId xmlns:p14="http://schemas.microsoft.com/office/powerpoint/2010/main" val="3527343244"/>
       </p:ext>
     </p:extLst>
   </p:cSld>

</xml_diff>